<commit_message>
Architekturübersicht besser lesbar gemacht.
</commit_message>
<xml_diff>
--- a/doc/ausarbeitung/img/Implementierung/ArchitekturAusfuehrlich.pptx
+++ b/doc/ausarbeitung/img/Implementierung/ArchitekturAusfuehrlich.pptx
@@ -259,7 +259,7 @@
           <a:p>
             <a:fld id="{1D46D211-75CF-4CE6-BC08-A5BE287A88DA}" type="datetimeFigureOut">
               <a:rPr lang="de-DE" smtClean="0"/>
-              <a:t>22.01.2019</a:t>
+              <a:t>29.01.2019</a:t>
             </a:fld>
             <a:endParaRPr lang="de-DE"/>
           </a:p>
@@ -457,7 +457,7 @@
           <a:p>
             <a:fld id="{1D46D211-75CF-4CE6-BC08-A5BE287A88DA}" type="datetimeFigureOut">
               <a:rPr lang="de-DE" smtClean="0"/>
-              <a:t>22.01.2019</a:t>
+              <a:t>29.01.2019</a:t>
             </a:fld>
             <a:endParaRPr lang="de-DE"/>
           </a:p>
@@ -665,7 +665,7 @@
           <a:p>
             <a:fld id="{1D46D211-75CF-4CE6-BC08-A5BE287A88DA}" type="datetimeFigureOut">
               <a:rPr lang="de-DE" smtClean="0"/>
-              <a:t>22.01.2019</a:t>
+              <a:t>29.01.2019</a:t>
             </a:fld>
             <a:endParaRPr lang="de-DE"/>
           </a:p>
@@ -863,7 +863,7 @@
           <a:p>
             <a:fld id="{1D46D211-75CF-4CE6-BC08-A5BE287A88DA}" type="datetimeFigureOut">
               <a:rPr lang="de-DE" smtClean="0"/>
-              <a:t>22.01.2019</a:t>
+              <a:t>29.01.2019</a:t>
             </a:fld>
             <a:endParaRPr lang="de-DE"/>
           </a:p>
@@ -1138,7 +1138,7 @@
           <a:p>
             <a:fld id="{1D46D211-75CF-4CE6-BC08-A5BE287A88DA}" type="datetimeFigureOut">
               <a:rPr lang="de-DE" smtClean="0"/>
-              <a:t>22.01.2019</a:t>
+              <a:t>29.01.2019</a:t>
             </a:fld>
             <a:endParaRPr lang="de-DE"/>
           </a:p>
@@ -1403,7 +1403,7 @@
           <a:p>
             <a:fld id="{1D46D211-75CF-4CE6-BC08-A5BE287A88DA}" type="datetimeFigureOut">
               <a:rPr lang="de-DE" smtClean="0"/>
-              <a:t>22.01.2019</a:t>
+              <a:t>29.01.2019</a:t>
             </a:fld>
             <a:endParaRPr lang="de-DE"/>
           </a:p>
@@ -1815,7 +1815,7 @@
           <a:p>
             <a:fld id="{1D46D211-75CF-4CE6-BC08-A5BE287A88DA}" type="datetimeFigureOut">
               <a:rPr lang="de-DE" smtClean="0"/>
-              <a:t>22.01.2019</a:t>
+              <a:t>29.01.2019</a:t>
             </a:fld>
             <a:endParaRPr lang="de-DE"/>
           </a:p>
@@ -1956,7 +1956,7 @@
           <a:p>
             <a:fld id="{1D46D211-75CF-4CE6-BC08-A5BE287A88DA}" type="datetimeFigureOut">
               <a:rPr lang="de-DE" smtClean="0"/>
-              <a:t>22.01.2019</a:t>
+              <a:t>29.01.2019</a:t>
             </a:fld>
             <a:endParaRPr lang="de-DE"/>
           </a:p>
@@ -2069,7 +2069,7 @@
           <a:p>
             <a:fld id="{1D46D211-75CF-4CE6-BC08-A5BE287A88DA}" type="datetimeFigureOut">
               <a:rPr lang="de-DE" smtClean="0"/>
-              <a:t>22.01.2019</a:t>
+              <a:t>29.01.2019</a:t>
             </a:fld>
             <a:endParaRPr lang="de-DE"/>
           </a:p>
@@ -2380,7 +2380,7 @@
           <a:p>
             <a:fld id="{1D46D211-75CF-4CE6-BC08-A5BE287A88DA}" type="datetimeFigureOut">
               <a:rPr lang="de-DE" smtClean="0"/>
-              <a:t>22.01.2019</a:t>
+              <a:t>29.01.2019</a:t>
             </a:fld>
             <a:endParaRPr lang="de-DE"/>
           </a:p>
@@ -2668,7 +2668,7 @@
           <a:p>
             <a:fld id="{1D46D211-75CF-4CE6-BC08-A5BE287A88DA}" type="datetimeFigureOut">
               <a:rPr lang="de-DE" smtClean="0"/>
-              <a:t>22.01.2019</a:t>
+              <a:t>29.01.2019</a:t>
             </a:fld>
             <a:endParaRPr lang="de-DE"/>
           </a:p>
@@ -2909,7 +2909,7 @@
           <a:p>
             <a:fld id="{1D46D211-75CF-4CE6-BC08-A5BE287A88DA}" type="datetimeFigureOut">
               <a:rPr lang="de-DE" smtClean="0"/>
-              <a:t>22.01.2019</a:t>
+              <a:t>29.01.2019</a:t>
             </a:fld>
             <a:endParaRPr lang="de-DE"/>
           </a:p>
@@ -3425,7 +3425,7 @@
           <a:lstStyle/>
           <a:p>
             <a:pPr algn="ctr"/>
-            <a:endParaRPr lang="de-DE"/>
+            <a:endParaRPr lang="de-DE" b="1"/>
           </a:p>
         </p:txBody>
       </p:sp>
@@ -3451,11 +3451,12 @@
           <a:prstGeom prst="straightConnector1">
             <a:avLst/>
           </a:prstGeom>
-          <a:ln w="15875">
+          <a:ln w="25400">
             <a:solidFill>
-              <a:schemeClr val="accent2"/>
+              <a:srgbClr val="CC0000"/>
             </a:solidFill>
-            <a:tailEnd type="triangle"/>
+            <a:headEnd w="lg" len="med"/>
+            <a:tailEnd type="triangle" w="lg" len="med"/>
           </a:ln>
         </p:spPr>
         <p:style>
@@ -3526,29 +3527,28 @@
           <a:p>
             <a:pPr algn="ctr"/>
             <a:r>
-              <a:rPr lang="de-DE" dirty="0"/>
+              <a:rPr lang="de-DE" b="1" dirty="0"/>
               <a:t>Websocket-Request-</a:t>
             </a:r>
             <a:r>
-              <a:rPr lang="de-DE" dirty="0" err="1"/>
+              <a:rPr lang="de-DE" b="1" dirty="0" err="1"/>
               <a:t>To</a:t>
             </a:r>
             <a:r>
-              <a:rPr lang="de-DE" dirty="0"/>
+              <a:rPr lang="de-DE" b="1" dirty="0"/>
               <a:t>-MPI</a:t>
             </a:r>
           </a:p>
           <a:p>
             <a:pPr algn="ctr"/>
             <a:r>
-              <a:rPr lang="de-DE" sz="1200" dirty="0" err="1"/>
+              <a:rPr lang="de-DE" sz="1300" b="1" dirty="0" err="1"/>
               <a:t>Shared</a:t>
             </a:r>
             <a:r>
-              <a:rPr lang="de-DE" sz="1200" dirty="0"/>
+              <a:rPr lang="de-DE" sz="1300" b="1" dirty="0"/>
               <a:t> Data</a:t>
             </a:r>
-            <a:endParaRPr lang="de-DE" dirty="0"/>
           </a:p>
         </p:txBody>
       </p:sp>
@@ -3576,7 +3576,7 @@
           <a:prstGeom prst="straightConnector1">
             <a:avLst/>
           </a:prstGeom>
-          <a:ln w="12700">
+          <a:ln w="19050">
             <a:solidFill>
               <a:schemeClr val="tx2">
                 <a:lumMod val="75000"/>
@@ -3618,13 +3618,13 @@
         </p:nvCxnSpPr>
         <p:spPr>
           <a:xfrm>
-            <a:off x="6752422" y="2371013"/>
-            <a:ext cx="374" cy="545577"/>
+            <a:off x="6746617" y="2373747"/>
+            <a:ext cx="6179" cy="542843"/>
           </a:xfrm>
           <a:prstGeom prst="straightConnector1">
             <a:avLst/>
           </a:prstGeom>
-          <a:ln w="12700">
+          <a:ln w="19050">
             <a:solidFill>
               <a:schemeClr val="tx2">
                 <a:lumMod val="75000"/>
@@ -3672,7 +3672,7 @@
           <a:prstGeom prst="straightConnector1">
             <a:avLst/>
           </a:prstGeom>
-          <a:ln w="12700">
+          <a:ln w="19050">
             <a:solidFill>
               <a:schemeClr val="tx2">
                 <a:lumMod val="75000"/>
@@ -3720,7 +3720,7 @@
           <a:prstGeom prst="straightConnector1">
             <a:avLst/>
           </a:prstGeom>
-          <a:ln w="12700">
+          <a:ln w="19050">
             <a:solidFill>
               <a:schemeClr val="tx2">
                 <a:lumMod val="75000"/>
@@ -3799,7 +3799,7 @@
           <a:lstStyle/>
           <a:p>
             <a:pPr algn="ctr"/>
-            <a:endParaRPr lang="de-DE"/>
+            <a:endParaRPr lang="de-DE" b="1"/>
           </a:p>
         </p:txBody>
       </p:sp>
@@ -3833,7 +3833,7 @@
           <a:p>
             <a:pPr algn="ctr"/>
             <a:r>
-              <a:rPr lang="de-DE" dirty="0">
+              <a:rPr lang="de-DE" b="1" dirty="0">
                 <a:solidFill>
                   <a:schemeClr val="accent1"/>
                 </a:solidFill>
@@ -3873,7 +3873,7 @@
           <a:p>
             <a:pPr algn="ctr"/>
             <a:r>
-              <a:rPr lang="de-DE" dirty="0" err="1">
+              <a:rPr lang="de-DE" b="1" dirty="0" err="1">
                 <a:solidFill>
                   <a:schemeClr val="accent6"/>
                 </a:solidFill>
@@ -3881,7 +3881,7 @@
               <a:t>Worker</a:t>
             </a:r>
             <a:r>
-              <a:rPr lang="de-DE" dirty="0">
+              <a:rPr lang="de-DE" b="1" dirty="0">
                 <a:solidFill>
                   <a:schemeClr val="accent6"/>
                 </a:solidFill>
@@ -3944,18 +3944,18 @@
           <a:p>
             <a:pPr algn="ctr"/>
             <a:r>
-              <a:rPr lang="de-DE" dirty="0" err="1"/>
+              <a:rPr lang="de-DE" b="1" dirty="0" err="1"/>
               <a:t>T</a:t>
             </a:r>
             <a:r>
-              <a:rPr lang="de-DE" baseline="-25000" dirty="0" err="1"/>
+              <a:rPr lang="de-DE" b="1" baseline="-25000" dirty="0" err="1"/>
               <a:t>OpenMP</a:t>
             </a:r>
             <a:r>
-              <a:rPr lang="de-DE" baseline="-25000" dirty="0"/>
+              <a:rPr lang="de-DE" b="1" baseline="-25000" dirty="0"/>
               <a:t> 1</a:t>
             </a:r>
-            <a:endParaRPr lang="de-DE" dirty="0"/>
+            <a:endParaRPr lang="de-DE" b="1" dirty="0"/>
           </a:p>
         </p:txBody>
       </p:sp>
@@ -4012,18 +4012,18 @@
           <a:p>
             <a:pPr algn="ctr"/>
             <a:r>
-              <a:rPr lang="de-DE" dirty="0" err="1"/>
+              <a:rPr lang="de-DE" b="1" dirty="0" err="1"/>
               <a:t>T</a:t>
             </a:r>
             <a:r>
-              <a:rPr lang="de-DE" baseline="-25000" dirty="0" err="1"/>
+              <a:rPr lang="de-DE" b="1" baseline="-25000" dirty="0" err="1"/>
               <a:t>OpenMP</a:t>
             </a:r>
             <a:r>
-              <a:rPr lang="de-DE" baseline="-25000" dirty="0"/>
+              <a:rPr lang="de-DE" b="1" baseline="-25000" dirty="0"/>
               <a:t> m</a:t>
             </a:r>
-            <a:endParaRPr lang="de-DE" dirty="0"/>
+            <a:endParaRPr lang="de-DE" b="1" dirty="0"/>
           </a:p>
         </p:txBody>
       </p:sp>
@@ -4079,7 +4079,7 @@
           <a:lstStyle/>
           <a:p>
             <a:pPr algn="ctr"/>
-            <a:endParaRPr lang="de-DE"/>
+            <a:endParaRPr lang="de-DE" b="1"/>
           </a:p>
         </p:txBody>
       </p:sp>
@@ -4135,7 +4135,7 @@
           <a:lstStyle/>
           <a:p>
             <a:pPr algn="ctr"/>
-            <a:endParaRPr lang="de-DE"/>
+            <a:endParaRPr lang="de-DE" b="1"/>
           </a:p>
         </p:txBody>
       </p:sp>
@@ -4191,7 +4191,7 @@
           <a:lstStyle/>
           <a:p>
             <a:pPr algn="ctr"/>
-            <a:endParaRPr lang="de-DE"/>
+            <a:endParaRPr lang="de-DE" b="1"/>
           </a:p>
         </p:txBody>
       </p:sp>
@@ -4217,7 +4217,7 @@
           <a:prstGeom prst="straightConnector1">
             <a:avLst/>
           </a:prstGeom>
-          <a:ln w="12700">
+          <a:ln w="19050">
             <a:solidFill>
               <a:schemeClr val="accent6">
                 <a:lumMod val="75000"/>
@@ -4264,7 +4264,7 @@
           <a:prstGeom prst="straightConnector1">
             <a:avLst/>
           </a:prstGeom>
-          <a:ln w="12700">
+          <a:ln w="19050">
             <a:solidFill>
               <a:schemeClr val="accent6">
                 <a:lumMod val="75000"/>
@@ -4303,8 +4303,8 @@
         </p:nvSpPr>
         <p:spPr>
           <a:xfrm>
-            <a:off x="9083479" y="2026434"/>
-            <a:ext cx="725032" cy="253916"/>
+            <a:off x="8940707" y="2026434"/>
+            <a:ext cx="867804" cy="292388"/>
           </a:xfrm>
           <a:prstGeom prst="rect">
             <a:avLst/>
@@ -4318,14 +4318,14 @@
           <a:lstStyle/>
           <a:p>
             <a:r>
-              <a:rPr lang="de-DE" sz="1050" dirty="0" err="1">
+              <a:rPr lang="de-DE" sz="1300" b="1" dirty="0" err="1">
                 <a:solidFill>
                   <a:schemeClr val="bg1"/>
                 </a:solidFill>
               </a:rPr>
               <a:t>OpenMP</a:t>
             </a:r>
-            <a:endParaRPr lang="de-DE" sz="1000" dirty="0">
+            <a:endParaRPr lang="de-DE" sz="1300" b="1" dirty="0">
               <a:solidFill>
                 <a:schemeClr val="bg1"/>
               </a:solidFill>
@@ -4348,7 +4348,7 @@
         <p:spPr>
           <a:xfrm>
             <a:off x="11081613" y="2047599"/>
-            <a:ext cx="795936" cy="253916"/>
+            <a:ext cx="795936" cy="292388"/>
           </a:xfrm>
           <a:prstGeom prst="rect">
             <a:avLst/>
@@ -4362,14 +4362,14 @@
           <a:lstStyle/>
           <a:p>
             <a:r>
-              <a:rPr lang="de-DE" sz="1050" dirty="0" err="1">
+              <a:rPr lang="de-DE" sz="1300" b="1" dirty="0" err="1">
                 <a:solidFill>
                   <a:schemeClr val="bg1"/>
                 </a:solidFill>
               </a:rPr>
               <a:t>OpenMP</a:t>
             </a:r>
-            <a:endParaRPr lang="de-DE" sz="1000" dirty="0">
+            <a:endParaRPr lang="de-DE" sz="1300" b="1" dirty="0">
               <a:solidFill>
                 <a:schemeClr val="bg1"/>
               </a:solidFill>
@@ -4432,7 +4432,7 @@
           <a:lstStyle/>
           <a:p>
             <a:pPr algn="ctr"/>
-            <a:endParaRPr lang="de-DE"/>
+            <a:endParaRPr lang="de-DE" b="1"/>
           </a:p>
         </p:txBody>
       </p:sp>
@@ -4466,7 +4466,7 @@
           <a:p>
             <a:pPr algn="ctr"/>
             <a:r>
-              <a:rPr lang="de-DE" dirty="0" err="1">
+              <a:rPr lang="de-DE" b="1" dirty="0" err="1">
                 <a:solidFill>
                   <a:schemeClr val="accent6"/>
                 </a:solidFill>
@@ -4474,7 +4474,7 @@
               <a:t>Worker</a:t>
             </a:r>
             <a:r>
-              <a:rPr lang="de-DE" dirty="0">
+              <a:rPr lang="de-DE" b="1" dirty="0">
                 <a:solidFill>
                   <a:schemeClr val="accent6"/>
                 </a:solidFill>
@@ -4537,18 +4537,18 @@
           <a:p>
             <a:pPr algn="ctr"/>
             <a:r>
-              <a:rPr lang="de-DE" dirty="0" err="1"/>
+              <a:rPr lang="de-DE" b="1" dirty="0" err="1"/>
               <a:t>T</a:t>
             </a:r>
             <a:r>
-              <a:rPr lang="de-DE" baseline="-25000" dirty="0" err="1"/>
+              <a:rPr lang="de-DE" b="1" baseline="-25000" dirty="0" err="1"/>
               <a:t>OpenMP</a:t>
             </a:r>
             <a:r>
-              <a:rPr lang="de-DE" baseline="-25000" dirty="0"/>
+              <a:rPr lang="de-DE" b="1" baseline="-25000" dirty="0"/>
               <a:t> 1</a:t>
             </a:r>
-            <a:endParaRPr lang="de-DE" dirty="0"/>
+            <a:endParaRPr lang="de-DE" b="1" dirty="0"/>
           </a:p>
         </p:txBody>
       </p:sp>
@@ -4605,18 +4605,18 @@
           <a:p>
             <a:pPr algn="ctr"/>
             <a:r>
-              <a:rPr lang="de-DE" dirty="0" err="1"/>
+              <a:rPr lang="de-DE" b="1" dirty="0" err="1"/>
               <a:t>T</a:t>
             </a:r>
             <a:r>
-              <a:rPr lang="de-DE" baseline="-25000" dirty="0" err="1"/>
+              <a:rPr lang="de-DE" b="1" baseline="-25000" dirty="0" err="1"/>
               <a:t>OpenMP</a:t>
             </a:r>
             <a:r>
-              <a:rPr lang="de-DE" baseline="-25000" dirty="0"/>
+              <a:rPr lang="de-DE" b="1" baseline="-25000" dirty="0"/>
               <a:t> m</a:t>
             </a:r>
-            <a:endParaRPr lang="de-DE" dirty="0"/>
+            <a:endParaRPr lang="de-DE" b="1" dirty="0"/>
           </a:p>
         </p:txBody>
       </p:sp>
@@ -4672,7 +4672,7 @@
           <a:lstStyle/>
           <a:p>
             <a:pPr algn="ctr"/>
-            <a:endParaRPr lang="de-DE"/>
+            <a:endParaRPr lang="de-DE" b="1"/>
           </a:p>
         </p:txBody>
       </p:sp>
@@ -4728,7 +4728,7 @@
           <a:lstStyle/>
           <a:p>
             <a:pPr algn="ctr"/>
-            <a:endParaRPr lang="de-DE"/>
+            <a:endParaRPr lang="de-DE" b="1"/>
           </a:p>
         </p:txBody>
       </p:sp>
@@ -4784,7 +4784,7 @@
           <a:lstStyle/>
           <a:p>
             <a:pPr algn="ctr"/>
-            <a:endParaRPr lang="de-DE"/>
+            <a:endParaRPr lang="de-DE" b="1"/>
           </a:p>
         </p:txBody>
       </p:sp>
@@ -4810,7 +4810,7 @@
           <a:prstGeom prst="straightConnector1">
             <a:avLst/>
           </a:prstGeom>
-          <a:ln w="12700">
+          <a:ln w="19050">
             <a:solidFill>
               <a:schemeClr val="accent6">
                 <a:lumMod val="75000"/>
@@ -4857,7 +4857,7 @@
           <a:prstGeom prst="straightConnector1">
             <a:avLst/>
           </a:prstGeom>
-          <a:ln w="12700">
+          <a:ln w="19050">
             <a:solidFill>
               <a:schemeClr val="accent6">
                 <a:lumMod val="75000"/>
@@ -4937,7 +4937,7 @@
           <a:lstStyle/>
           <a:p>
             <a:pPr algn="ctr"/>
-            <a:endParaRPr lang="de-DE"/>
+            <a:endParaRPr lang="de-DE" b="1"/>
           </a:p>
         </p:txBody>
       </p:sp>
@@ -4996,7 +4996,7 @@
           <a:lstStyle/>
           <a:p>
             <a:pPr algn="ctr"/>
-            <a:endParaRPr lang="de-DE"/>
+            <a:endParaRPr lang="de-DE" b="1"/>
           </a:p>
         </p:txBody>
       </p:sp>
@@ -5055,7 +5055,7 @@
           <a:lstStyle/>
           <a:p>
             <a:pPr algn="ctr"/>
-            <a:endParaRPr lang="de-DE"/>
+            <a:endParaRPr lang="de-DE" b="1"/>
           </a:p>
         </p:txBody>
       </p:sp>
@@ -5081,12 +5081,14 @@
           <a:prstGeom prst="line">
             <a:avLst/>
           </a:prstGeom>
-          <a:ln w="15875">
+          <a:ln w="25400">
             <a:solidFill>
               <a:schemeClr val="bg1">
                 <a:lumMod val="50000"/>
               </a:schemeClr>
             </a:solidFill>
+            <a:headEnd w="lg" len="med"/>
+            <a:tailEnd w="lg" len="med"/>
           </a:ln>
         </p:spPr>
         <p:style>
@@ -5126,12 +5128,14 @@
           <a:prstGeom prst="line">
             <a:avLst/>
           </a:prstGeom>
-          <a:ln w="15875">
+          <a:ln w="25400">
             <a:solidFill>
               <a:schemeClr val="bg1">
                 <a:lumMod val="50000"/>
               </a:schemeClr>
             </a:solidFill>
+            <a:headEnd w="lg" len="med"/>
+            <a:tailEnd w="lg" len="med"/>
           </a:ln>
         </p:spPr>
         <p:style>
@@ -5166,18 +5170,19 @@
         <p:spPr>
           <a:xfrm>
             <a:off x="8006078" y="1117827"/>
-            <a:ext cx="1652158" cy="0"/>
+            <a:ext cx="1604700" cy="0"/>
           </a:xfrm>
           <a:prstGeom prst="straightConnector1">
             <a:avLst/>
           </a:prstGeom>
-          <a:ln w="15875">
+          <a:ln w="25400">
             <a:solidFill>
               <a:schemeClr val="bg1">
                 <a:lumMod val="50000"/>
               </a:schemeClr>
             </a:solidFill>
-            <a:tailEnd type="triangle"/>
+            <a:headEnd w="lg" len="med"/>
+            <a:tailEnd type="triangle" w="lg" len="med"/>
           </a:ln>
         </p:spPr>
         <p:style>
@@ -5217,12 +5222,14 @@
           <a:prstGeom prst="line">
             <a:avLst/>
           </a:prstGeom>
-          <a:ln w="15875">
+          <a:ln w="25400">
             <a:solidFill>
               <a:schemeClr val="bg1">
                 <a:lumMod val="50000"/>
               </a:schemeClr>
             </a:solidFill>
+            <a:headEnd w="lg" len="med"/>
+            <a:tailEnd w="lg" len="med"/>
           </a:ln>
         </p:spPr>
         <p:style>
@@ -5262,12 +5269,14 @@
           <a:prstGeom prst="line">
             <a:avLst/>
           </a:prstGeom>
-          <a:ln w="15875">
+          <a:ln w="25400">
             <a:solidFill>
               <a:schemeClr val="bg1">
                 <a:lumMod val="50000"/>
               </a:schemeClr>
             </a:solidFill>
+            <a:headEnd w="lg" len="med"/>
+            <a:tailEnd w="lg" len="med"/>
           </a:ln>
         </p:spPr>
         <p:style>
@@ -5307,13 +5316,14 @@
           <a:prstGeom prst="straightConnector1">
             <a:avLst/>
           </a:prstGeom>
-          <a:ln w="15875">
+          <a:ln w="25400">
             <a:solidFill>
               <a:schemeClr val="bg1">
                 <a:lumMod val="50000"/>
               </a:schemeClr>
             </a:solidFill>
-            <a:tailEnd type="triangle"/>
+            <a:headEnd w="lg" len="med"/>
+            <a:tailEnd type="triangle" w="lg" len="med"/>
           </a:ln>
         </p:spPr>
         <p:style>
@@ -5346,7 +5356,7 @@
         <p:spPr>
           <a:xfrm>
             <a:off x="8090403" y="835199"/>
-            <a:ext cx="577402" cy="261610"/>
+            <a:ext cx="659924" cy="292388"/>
           </a:xfrm>
           <a:prstGeom prst="rect">
             <a:avLst/>
@@ -5360,7 +5370,7 @@
           <a:lstStyle/>
           <a:p>
             <a:r>
-              <a:rPr lang="de-DE" sz="1050" dirty="0">
+              <a:rPr lang="de-DE" sz="1300" b="1" dirty="0">
                 <a:solidFill>
                   <a:schemeClr val="bg1">
                     <a:lumMod val="50000"/>
@@ -5369,13 +5379,6 @@
               </a:rPr>
               <a:t>Region</a:t>
             </a:r>
-            <a:endParaRPr lang="de-DE" sz="3200" dirty="0">
-              <a:solidFill>
-                <a:schemeClr val="bg1">
-                  <a:lumMod val="50000"/>
-                </a:schemeClr>
-              </a:solidFill>
-            </a:endParaRPr>
           </a:p>
         </p:txBody>
       </p:sp>
@@ -5392,9 +5395,9 @@
           <p:nvPr/>
         </p:nvSpPr>
         <p:spPr>
-          <a:xfrm>
-            <a:off x="7604057" y="5610803"/>
-            <a:ext cx="1220206" cy="430887"/>
+          <a:xfrm rot="16200000">
+            <a:off x="7164505" y="3442683"/>
+            <a:ext cx="2379727" cy="292388"/>
           </a:xfrm>
           <a:prstGeom prst="rect">
             <a:avLst/>
@@ -5402,14 +5405,14 @@
           <a:noFill/>
         </p:spPr>
         <p:txBody>
-          <a:bodyPr wrap="none" rtlCol="0">
+          <a:bodyPr wrap="square" rtlCol="0">
             <a:spAutoFit/>
           </a:bodyPr>
           <a:lstStyle/>
           <a:p>
             <a:pPr algn="ctr"/>
             <a:r>
-              <a:rPr lang="de-DE" sz="1050" dirty="0" err="1">
+              <a:rPr lang="de-DE" sz="1300" b="1" dirty="0" err="1">
                 <a:solidFill>
                   <a:schemeClr val="bg1">
                     <a:lumMod val="50000"/>
@@ -5419,41 +5422,15 @@
               <a:t>WorkerInfo</a:t>
             </a:r>
             <a:r>
-              <a:rPr lang="de-DE" sz="1050" dirty="0">
+              <a:rPr lang="de-DE" sz="1300" b="1" dirty="0">
                 <a:solidFill>
                   <a:schemeClr val="bg1">
                     <a:lumMod val="50000"/>
                   </a:schemeClr>
                 </a:solidFill>
               </a:rPr>
-              <a:t>,</a:t>
-            </a:r>
-            <a:br>
-              <a:rPr lang="de-DE" sz="1050" dirty="0">
-                <a:solidFill>
-                  <a:schemeClr val="bg1">
-                    <a:lumMod val="50000"/>
-                  </a:schemeClr>
-                </a:solidFill>
-              </a:rPr>
-            </a:br>
-            <a:r>
-              <a:rPr lang="de-DE" sz="1050" dirty="0">
-                <a:solidFill>
-                  <a:schemeClr val="bg1">
-                    <a:lumMod val="50000"/>
-                  </a:schemeClr>
-                </a:solidFill>
-              </a:rPr>
-              <a:t>berechnete Daten</a:t>
-            </a:r>
-            <a:endParaRPr lang="de-DE" sz="2800" dirty="0">
-              <a:solidFill>
-                <a:schemeClr val="bg1">
-                  <a:lumMod val="50000"/>
-                </a:schemeClr>
-              </a:solidFill>
-            </a:endParaRPr>
+              <a:t>, berechnete Daten</a:t>
+            </a:r>
           </a:p>
         </p:txBody>
       </p:sp>
@@ -5507,7 +5484,7 @@
           <a:lstStyle/>
           <a:p>
             <a:pPr algn="ctr"/>
-            <a:endParaRPr lang="de-DE"/>
+            <a:endParaRPr lang="de-DE" b="1"/>
           </a:p>
         </p:txBody>
       </p:sp>
@@ -5539,7 +5516,7 @@
           </a:bodyPr>
           <a:lstStyle/>
           <a:p>
-            <a:endParaRPr lang="de-DE" dirty="0">
+            <a:endParaRPr lang="de-DE" b="1" dirty="0">
               <a:solidFill>
                 <a:schemeClr val="bg1">
                   <a:lumMod val="50000"/>
@@ -5563,8 +5540,8 @@
         </p:nvSpPr>
         <p:spPr>
           <a:xfrm>
-            <a:off x="7187229" y="6457453"/>
-            <a:ext cx="2114040" cy="369332"/>
+            <a:off x="7159978" y="6457453"/>
+            <a:ext cx="2168542" cy="369332"/>
           </a:xfrm>
           <a:prstGeom prst="rect">
             <a:avLst/>
@@ -5578,7 +5555,7 @@
           <a:p>
             <a:pPr algn="ctr"/>
             <a:r>
-              <a:rPr lang="de-DE" dirty="0">
+              <a:rPr lang="de-DE" b="1" dirty="0">
                 <a:solidFill>
                   <a:schemeClr val="bg1">
                     <a:lumMod val="50000"/>
@@ -5604,8 +5581,8 @@
         </p:nvSpPr>
         <p:spPr>
           <a:xfrm>
-            <a:off x="9083479" y="4940355"/>
-            <a:ext cx="725032" cy="253916"/>
+            <a:off x="8985867" y="4940355"/>
+            <a:ext cx="822644" cy="292388"/>
           </a:xfrm>
           <a:prstGeom prst="rect">
             <a:avLst/>
@@ -5619,14 +5596,14 @@
           <a:lstStyle/>
           <a:p>
             <a:r>
-              <a:rPr lang="de-DE" sz="1050" dirty="0" err="1">
+              <a:rPr lang="de-DE" sz="1300" b="1" dirty="0" err="1">
                 <a:solidFill>
                   <a:schemeClr val="bg1"/>
                 </a:solidFill>
               </a:rPr>
               <a:t>OpenMP</a:t>
             </a:r>
-            <a:endParaRPr lang="de-DE" sz="1000" dirty="0">
+            <a:endParaRPr lang="de-DE" sz="1300" b="1" dirty="0">
               <a:solidFill>
                 <a:schemeClr val="bg1"/>
               </a:solidFill>
@@ -5649,7 +5626,7 @@
         <p:spPr>
           <a:xfrm>
             <a:off x="11081613" y="4961520"/>
-            <a:ext cx="795936" cy="253916"/>
+            <a:ext cx="795936" cy="292388"/>
           </a:xfrm>
           <a:prstGeom prst="rect">
             <a:avLst/>
@@ -5663,14 +5640,14 @@
           <a:lstStyle/>
           <a:p>
             <a:r>
-              <a:rPr lang="de-DE" sz="1050" dirty="0" err="1">
+              <a:rPr lang="de-DE" sz="1300" b="1" dirty="0" err="1">
                 <a:solidFill>
                   <a:schemeClr val="bg1"/>
                 </a:solidFill>
               </a:rPr>
               <a:t>OpenMP</a:t>
             </a:r>
-            <a:endParaRPr lang="de-DE" sz="1000" dirty="0">
+            <a:endParaRPr lang="de-DE" sz="1300" b="1" dirty="0">
               <a:solidFill>
                 <a:schemeClr val="bg1"/>
               </a:solidFill>
@@ -5692,8 +5669,8 @@
         </p:nvSpPr>
         <p:spPr>
           <a:xfrm>
-            <a:off x="2309753" y="1411300"/>
-            <a:ext cx="1571264" cy="415498"/>
+            <a:off x="2208153" y="1334084"/>
+            <a:ext cx="1928861" cy="492443"/>
           </a:xfrm>
           <a:prstGeom prst="rect">
             <a:avLst/>
@@ -5709,24 +5686,24 @@
           <a:lstStyle/>
           <a:p>
             <a:r>
-              <a:rPr lang="de-DE" sz="1050" dirty="0">
+              <a:rPr lang="de-DE" sz="1300" b="1" dirty="0">
                 <a:solidFill>
-                  <a:schemeClr val="accent2"/>
+                  <a:srgbClr val="CC0000"/>
                 </a:solidFill>
               </a:rPr>
               <a:t>Region, Balancer, Fraktal,</a:t>
             </a:r>
             <a:br>
-              <a:rPr lang="de-DE" sz="1050" dirty="0">
+              <a:rPr lang="de-DE" sz="1300" b="1" dirty="0">
                 <a:solidFill>
-                  <a:schemeClr val="accent2"/>
+                  <a:srgbClr val="CC0000"/>
                 </a:solidFill>
               </a:rPr>
             </a:br>
             <a:r>
-              <a:rPr lang="de-DE" sz="1050" dirty="0">
+              <a:rPr lang="de-DE" sz="1300" b="1" dirty="0">
                 <a:solidFill>
-                  <a:schemeClr val="accent2"/>
+                  <a:srgbClr val="CC0000"/>
                 </a:solidFill>
               </a:rPr>
               <a:t>Knotenzahl</a:t>
@@ -5749,7 +5726,7 @@
         <p:spPr>
           <a:xfrm>
             <a:off x="2396595" y="2520735"/>
-            <a:ext cx="1399742" cy="261610"/>
+            <a:ext cx="1653338" cy="292388"/>
           </a:xfrm>
           <a:prstGeom prst="rect">
             <a:avLst/>
@@ -5765,9 +5742,9 @@
           <a:lstStyle/>
           <a:p>
             <a:r>
-              <a:rPr lang="de-DE" sz="1050" dirty="0">
+              <a:rPr lang="de-DE" sz="1300" b="1" dirty="0">
                 <a:solidFill>
-                  <a:schemeClr val="accent2"/>
+                  <a:srgbClr val="CC0000"/>
                 </a:solidFill>
               </a:rPr>
               <a:t>Balancierte Regionen</a:t>
@@ -5789,8 +5766,8 @@
         </p:nvSpPr>
         <p:spPr>
           <a:xfrm>
-            <a:off x="2503485" y="516137"/>
-            <a:ext cx="1175322" cy="415498"/>
+            <a:off x="2379573" y="439937"/>
+            <a:ext cx="1423147" cy="492443"/>
           </a:xfrm>
           <a:prstGeom prst="rect">
             <a:avLst/>
@@ -5807,32 +5784,32 @@
           <a:p>
             <a:pPr algn="ctr"/>
             <a:r>
-              <a:rPr lang="de-DE" sz="1050" dirty="0" err="1">
+              <a:rPr lang="de-DE" sz="1300" b="1" dirty="0" err="1">
                 <a:solidFill>
-                  <a:schemeClr val="accent2"/>
+                  <a:srgbClr val="CC0000"/>
                 </a:solidFill>
               </a:rPr>
               <a:t>WorkerInfo</a:t>
             </a:r>
             <a:r>
-              <a:rPr lang="de-DE" sz="1050" dirty="0">
+              <a:rPr lang="de-DE" sz="1300" b="1" dirty="0">
                 <a:solidFill>
-                  <a:schemeClr val="accent2"/>
+                  <a:srgbClr val="CC0000"/>
                 </a:solidFill>
               </a:rPr>
               <a:t>,</a:t>
             </a:r>
             <a:br>
-              <a:rPr lang="de-DE" sz="1050" dirty="0">
+              <a:rPr lang="de-DE" sz="1300" b="1" dirty="0">
                 <a:solidFill>
-                  <a:schemeClr val="accent2"/>
+                  <a:srgbClr val="CC0000"/>
                 </a:solidFill>
               </a:rPr>
             </a:br>
             <a:r>
-              <a:rPr lang="de-DE" sz="1050" dirty="0">
+              <a:rPr lang="de-DE" sz="1300" b="1" dirty="0">
                 <a:solidFill>
-                  <a:schemeClr val="accent2"/>
+                  <a:srgbClr val="CC0000"/>
                 </a:solidFill>
               </a:rPr>
               <a:t>berechnete Daten</a:t>
@@ -5854,8 +5831,8 @@
         </p:nvSpPr>
         <p:spPr>
           <a:xfrm>
-            <a:off x="577427" y="14393"/>
-            <a:ext cx="1252009" cy="646331"/>
+            <a:off x="562647" y="14393"/>
+            <a:ext cx="1281569" cy="646331"/>
           </a:xfrm>
           <a:prstGeom prst="rect">
             <a:avLst/>
@@ -5870,14 +5847,14 @@
           <a:p>
             <a:pPr algn="ctr"/>
             <a:r>
-              <a:rPr lang="de-DE" dirty="0"/>
+              <a:rPr lang="de-DE" b="1" dirty="0"/>
               <a:t>Browser</a:t>
             </a:r>
           </a:p>
           <a:p>
             <a:pPr algn="ctr"/>
             <a:r>
-              <a:rPr lang="de-DE" dirty="0"/>
+              <a:rPr lang="de-DE" b="1" dirty="0"/>
               <a:t>(JavaScript)</a:t>
             </a:r>
           </a:p>
@@ -5898,7 +5875,7 @@
         <p:spPr>
           <a:xfrm>
             <a:off x="6994313" y="162560"/>
-            <a:ext cx="1523815" cy="369332"/>
+            <a:ext cx="1543756" cy="369332"/>
           </a:xfrm>
           <a:prstGeom prst="rect">
             <a:avLst/>
@@ -5912,7 +5889,7 @@
           <a:lstStyle/>
           <a:p>
             <a:r>
-              <a:rPr lang="de-DE" dirty="0"/>
+              <a:rPr lang="de-DE" b="1" dirty="0"/>
               <a:t>Backend (C++)</a:t>
             </a:r>
           </a:p>
@@ -5943,7 +5920,7 @@
           </a:prstGeom>
           <a:ln w="15875">
             <a:solidFill>
-              <a:schemeClr val="accent2"/>
+              <a:srgbClr val="CC0000"/>
             </a:solidFill>
           </a:ln>
         </p:spPr>
@@ -5966,7 +5943,11 @@
           <a:lstStyle/>
           <a:p>
             <a:pPr algn="ctr"/>
-            <a:endParaRPr lang="de-DE"/>
+            <a:endParaRPr lang="de-DE" b="1">
+              <a:solidFill>
+                <a:srgbClr val="CC0000"/>
+              </a:solidFill>
+            </a:endParaRPr>
           </a:p>
         </p:txBody>
       </p:sp>
@@ -5984,8 +5965,8 @@
         </p:nvSpPr>
         <p:spPr>
           <a:xfrm>
-            <a:off x="1748527" y="6457453"/>
-            <a:ext cx="2770630" cy="369332"/>
+            <a:off x="1718358" y="6457453"/>
+            <a:ext cx="2830968" cy="369332"/>
           </a:xfrm>
           <a:prstGeom prst="rect">
             <a:avLst/>
@@ -5999,9 +5980,9 @@
           <a:p>
             <a:pPr algn="ctr"/>
             <a:r>
-              <a:rPr lang="de-DE" dirty="0">
+              <a:rPr lang="de-DE" b="1" dirty="0">
                 <a:solidFill>
-                  <a:schemeClr val="accent2"/>
+                  <a:srgbClr val="CC0000"/>
                 </a:solidFill>
               </a:rPr>
               <a:t>Websocket-Kommunikation</a:t>
@@ -6011,10 +5992,10 @@
       </p:sp>
       <p:sp>
         <p:nvSpPr>
-          <p:cNvPr id="64" name="Rechteck 63">
-            <a:extLst>
-              <a:ext uri="{FF2B5EF4-FFF2-40B4-BE49-F238E27FC236}">
-                <a16:creationId xmlns:a16="http://schemas.microsoft.com/office/drawing/2014/main" id="{3AE63BDF-3ED4-4E5A-B3E0-0CBE858C4109}"/>
+          <p:cNvPr id="69" name="Rechteck 68">
+            <a:extLst>
+              <a:ext uri="{FF2B5EF4-FFF2-40B4-BE49-F238E27FC236}">
+                <a16:creationId xmlns:a16="http://schemas.microsoft.com/office/drawing/2014/main" id="{D387A03F-A73C-4F33-BEC5-DBA7F461696E}"/>
               </a:ext>
             </a:extLst>
           </p:cNvPr>
@@ -6023,8 +6004,128 @@
         </p:nvSpPr>
         <p:spPr>
           <a:xfrm>
-            <a:off x="9666899" y="3878533"/>
-            <a:ext cx="1517263" cy="1026498"/>
+            <a:off x="6002139" y="1123625"/>
+            <a:ext cx="1488955" cy="1250122"/>
+          </a:xfrm>
+          <a:prstGeom prst="rect">
+            <a:avLst/>
+          </a:prstGeom>
+        </p:spPr>
+        <p:style>
+          <a:lnRef idx="2">
+            <a:schemeClr val="accent1">
+              <a:shade val="50000"/>
+            </a:schemeClr>
+          </a:lnRef>
+          <a:fillRef idx="1">
+            <a:schemeClr val="accent1"/>
+          </a:fillRef>
+          <a:effectRef idx="0">
+            <a:schemeClr val="accent1"/>
+          </a:effectRef>
+          <a:fontRef idx="minor">
+            <a:schemeClr val="lt1"/>
+          </a:fontRef>
+        </p:style>
+        <p:txBody>
+          <a:bodyPr rtlCol="0" anchor="ctr"/>
+          <a:lstStyle/>
+          <a:p>
+            <a:pPr algn="ctr"/>
+            <a:r>
+              <a:rPr lang="de-DE" b="1" dirty="0"/>
+              <a:t>Websocket-</a:t>
+            </a:r>
+            <a:r>
+              <a:rPr lang="de-DE" b="1" dirty="0" err="1"/>
+              <a:t>Result</a:t>
+            </a:r>
+            <a:r>
+              <a:rPr lang="de-DE" b="1" dirty="0"/>
+              <a:t>-Thread</a:t>
+            </a:r>
+            <a:br>
+              <a:rPr lang="de-DE" b="1" dirty="0"/>
+            </a:br>
+            <a:r>
+              <a:rPr lang="de-DE" sz="1300" b="1" dirty="0"/>
+              <a:t>Websocket</a:t>
+            </a:r>
+          </a:p>
+        </p:txBody>
+      </p:sp>
+      <p:sp>
+        <p:nvSpPr>
+          <p:cNvPr id="9" name="Rechteck 8">
+            <a:extLst>
+              <a:ext uri="{FF2B5EF4-FFF2-40B4-BE49-F238E27FC236}">
+                <a16:creationId xmlns:a16="http://schemas.microsoft.com/office/drawing/2014/main" id="{2A59CCAC-E2A1-4BAC-8B49-4E8238B546FE}"/>
+              </a:ext>
+            </a:extLst>
+          </p:cNvPr>
+          <p:cNvSpPr/>
+          <p:nvPr/>
+        </p:nvSpPr>
+        <p:spPr>
+          <a:xfrm>
+            <a:off x="5063054" y="4498090"/>
+            <a:ext cx="1772479" cy="1250122"/>
+          </a:xfrm>
+          <a:prstGeom prst="rect">
+            <a:avLst/>
+          </a:prstGeom>
+        </p:spPr>
+        <p:style>
+          <a:lnRef idx="2">
+            <a:schemeClr val="accent1">
+              <a:shade val="50000"/>
+            </a:schemeClr>
+          </a:lnRef>
+          <a:fillRef idx="1">
+            <a:schemeClr val="accent1"/>
+          </a:fillRef>
+          <a:effectRef idx="0">
+            <a:schemeClr val="accent1"/>
+          </a:effectRef>
+          <a:fontRef idx="minor">
+            <a:schemeClr val="lt1"/>
+          </a:fontRef>
+        </p:style>
+        <p:txBody>
+          <a:bodyPr rtlCol="0" anchor="ctr"/>
+          <a:lstStyle/>
+          <a:p>
+            <a:pPr algn="ctr"/>
+            <a:r>
+              <a:rPr lang="de-DE" b="1" dirty="0"/>
+              <a:t>MPI-Host-Thread</a:t>
+            </a:r>
+            <a:br>
+              <a:rPr lang="de-DE" b="1" dirty="0"/>
+            </a:br>
+            <a:r>
+              <a:rPr lang="de-DE" sz="1300" b="1" dirty="0"/>
+              <a:t>MPI-Kommunikation</a:t>
+            </a:r>
+          </a:p>
+        </p:txBody>
+      </p:sp>
+      <p:sp>
+        <p:nvSpPr>
+          <p:cNvPr id="3" name="Rechteck 2">
+            <a:extLst>
+              <a:ext uri="{FF2B5EF4-FFF2-40B4-BE49-F238E27FC236}">
+                <a16:creationId xmlns:a16="http://schemas.microsoft.com/office/drawing/2014/main" id="{C382B31E-E979-4C70-A9EA-0880CB40CA4A}"/>
+              </a:ext>
+            </a:extLst>
+          </p:cNvPr>
+          <p:cNvSpPr/>
+          <p:nvPr/>
+        </p:nvSpPr>
+        <p:spPr>
+          <a:xfrm>
+            <a:off x="9613876" y="966738"/>
+            <a:ext cx="1623308" cy="1026498"/>
           </a:xfrm>
           <a:prstGeom prst="rect">
             <a:avLst/>
@@ -6062,34 +6163,33 @@
           <a:p>
             <a:pPr algn="ctr"/>
             <a:r>
-              <a:rPr lang="de-DE" dirty="0"/>
+              <a:rPr lang="de-DE" b="1" dirty="0"/>
               <a:t>MPI-</a:t>
             </a:r>
             <a:r>
-              <a:rPr lang="de-DE" dirty="0" err="1"/>
+              <a:rPr lang="de-DE" b="1" dirty="0" err="1"/>
               <a:t>Worker</a:t>
             </a:r>
             <a:r>
-              <a:rPr lang="de-DE" dirty="0"/>
+              <a:rPr lang="de-DE" b="1" dirty="0"/>
               <a:t>-Thread</a:t>
             </a:r>
             <a:br>
-              <a:rPr lang="de-DE" dirty="0"/>
+              <a:rPr lang="de-DE" b="1" dirty="0"/>
             </a:br>
             <a:r>
-              <a:rPr lang="de-DE" sz="1200" dirty="0"/>
+              <a:rPr lang="de-DE" sz="1300" b="1" dirty="0"/>
               <a:t>MPI und Berechnung</a:t>
             </a:r>
-            <a:endParaRPr lang="de-DE" dirty="0"/>
-          </a:p>
-        </p:txBody>
-      </p:sp>
-      <p:sp>
-        <p:nvSpPr>
-          <p:cNvPr id="69" name="Rechteck 68">
-            <a:extLst>
-              <a:ext uri="{FF2B5EF4-FFF2-40B4-BE49-F238E27FC236}">
-                <a16:creationId xmlns:a16="http://schemas.microsoft.com/office/drawing/2014/main" id="{D387A03F-A73C-4F33-BEC5-DBA7F461696E}"/>
+          </a:p>
+        </p:txBody>
+      </p:sp>
+      <p:sp>
+        <p:nvSpPr>
+          <p:cNvPr id="8" name="Rechteck 7">
+            <a:extLst>
+              <a:ext uri="{FF2B5EF4-FFF2-40B4-BE49-F238E27FC236}">
+                <a16:creationId xmlns:a16="http://schemas.microsoft.com/office/drawing/2014/main" id="{2162955D-7DA5-4CD0-80D1-429FE3B4216C}"/>
               </a:ext>
             </a:extLst>
           </p:cNvPr>
@@ -6098,8 +6198,8 @@
         </p:nvSpPr>
         <p:spPr>
           <a:xfrm>
-            <a:off x="6007944" y="1120891"/>
-            <a:ext cx="1488955" cy="1250122"/>
+            <a:off x="4412439" y="1109887"/>
+            <a:ext cx="1408589" cy="1250122"/>
           </a:xfrm>
           <a:prstGeom prst="rect">
             <a:avLst/>
@@ -6127,34 +6227,83 @@
           <a:p>
             <a:pPr algn="ctr"/>
             <a:r>
-              <a:rPr lang="de-DE" dirty="0"/>
+              <a:rPr lang="de-DE" b="1" dirty="0"/>
               <a:t>Websocket-</a:t>
             </a:r>
             <a:r>
-              <a:rPr lang="de-DE" dirty="0" err="1"/>
-              <a:t>Result</a:t>
-            </a:r>
-            <a:r>
-              <a:rPr lang="de-DE" dirty="0"/>
+              <a:rPr lang="de-DE" b="1" dirty="0" err="1"/>
+              <a:t>Recv</a:t>
+            </a:r>
+            <a:r>
+              <a:rPr lang="de-DE" b="1" dirty="0"/>
               <a:t>-Thread</a:t>
             </a:r>
             <a:br>
-              <a:rPr lang="de-DE" dirty="0"/>
+              <a:rPr lang="de-DE" b="1" dirty="0"/>
             </a:br>
             <a:r>
-              <a:rPr lang="de-DE" sz="1200" dirty="0"/>
-              <a:t>Websocket</a:t>
-            </a:r>
-            <a:endParaRPr lang="de-DE" dirty="0"/>
-          </a:p>
-        </p:txBody>
-      </p:sp>
-      <p:sp>
-        <p:nvSpPr>
-          <p:cNvPr id="9" name="Rechteck 8">
-            <a:extLst>
-              <a:ext uri="{FF2B5EF4-FFF2-40B4-BE49-F238E27FC236}">
-                <a16:creationId xmlns:a16="http://schemas.microsoft.com/office/drawing/2014/main" id="{2A59CCAC-E2A1-4BAC-8B49-4E8238B546FE}"/>
+              <a:rPr lang="de-DE" sz="1300" b="1" dirty="0"/>
+              <a:t>Websocket und </a:t>
+            </a:r>
+            <a:r>
+              <a:rPr lang="de-DE" sz="1300" b="1" dirty="0" err="1"/>
+              <a:t>Balancing</a:t>
+            </a:r>
+            <a:endParaRPr lang="de-DE" sz="1300" b="1" dirty="0"/>
+          </a:p>
+        </p:txBody>
+      </p:sp>
+      <p:cxnSp>
+        <p:nvCxnSpPr>
+          <p:cNvPr id="77" name="Gerader Verbinder 76">
+            <a:extLst>
+              <a:ext uri="{FF2B5EF4-FFF2-40B4-BE49-F238E27FC236}">
+                <a16:creationId xmlns:a16="http://schemas.microsoft.com/office/drawing/2014/main" id="{1A9F6C7B-AB44-4E96-B41A-F043BE09EE50}"/>
+              </a:ext>
+            </a:extLst>
+          </p:cNvPr>
+          <p:cNvCxnSpPr>
+            <a:stCxn id="69" idx="0"/>
+          </p:cNvCxnSpPr>
+          <p:nvPr/>
+        </p:nvCxnSpPr>
+        <p:spPr>
+          <a:xfrm flipH="1" flipV="1">
+            <a:off x="6746616" y="958098"/>
+            <a:ext cx="1" cy="165527"/>
+          </a:xfrm>
+          <a:prstGeom prst="line">
+            <a:avLst/>
+          </a:prstGeom>
+          <a:ln w="25400">
+            <a:solidFill>
+              <a:srgbClr val="CC0000"/>
+            </a:solidFill>
+            <a:headEnd w="lg" len="med"/>
+            <a:tailEnd w="lg" len="med"/>
+          </a:ln>
+        </p:spPr>
+        <p:style>
+          <a:lnRef idx="1">
+            <a:schemeClr val="accent1"/>
+          </a:lnRef>
+          <a:fillRef idx="0">
+            <a:schemeClr val="accent1"/>
+          </a:fillRef>
+          <a:effectRef idx="0">
+            <a:schemeClr val="accent1"/>
+          </a:effectRef>
+          <a:fontRef idx="minor">
+            <a:schemeClr val="tx1"/>
+          </a:fontRef>
+        </p:style>
+      </p:cxnSp>
+      <p:sp>
+        <p:nvSpPr>
+          <p:cNvPr id="4" name="Rechteck 3">
+            <a:extLst>
+              <a:ext uri="{FF2B5EF4-FFF2-40B4-BE49-F238E27FC236}">
+                <a16:creationId xmlns:a16="http://schemas.microsoft.com/office/drawing/2014/main" id="{07ACD520-35FF-4146-A39B-D807EEC24F12}"/>
               </a:ext>
             </a:extLst>
           </p:cNvPr>
@@ -6163,12 +6312,22 @@
         </p:nvSpPr>
         <p:spPr>
           <a:xfrm>
-            <a:off x="5063054" y="4498090"/>
-            <a:ext cx="1772479" cy="1250122"/>
+            <a:off x="336899" y="762324"/>
+            <a:ext cx="1711446" cy="5311589"/>
           </a:xfrm>
           <a:prstGeom prst="rect">
             <a:avLst/>
           </a:prstGeom>
+          <a:solidFill>
+            <a:schemeClr val="accent2"/>
+          </a:solidFill>
+          <a:ln>
+            <a:solidFill>
+              <a:schemeClr val="accent2">
+                <a:lumMod val="75000"/>
+              </a:schemeClr>
+            </a:solidFill>
+          </a:ln>
         </p:spPr>
         <p:style>
           <a:lnRef idx="2">
@@ -6192,26 +6351,108 @@
           <a:p>
             <a:pPr algn="ctr"/>
             <a:r>
-              <a:rPr lang="de-DE" dirty="0"/>
-              <a:t>MPI-Host-Thread</a:t>
-            </a:r>
-            <a:br>
-              <a:rPr lang="de-DE" dirty="0"/>
-            </a:br>
-            <a:r>
-              <a:rPr lang="de-DE" sz="1200" dirty="0"/>
-              <a:t>MPI-Kommunikation</a:t>
-            </a:r>
-            <a:endParaRPr lang="de-DE" dirty="0"/>
-          </a:p>
-        </p:txBody>
-      </p:sp>
-      <p:sp>
-        <p:nvSpPr>
-          <p:cNvPr id="3" name="Rechteck 2">
-            <a:extLst>
-              <a:ext uri="{FF2B5EF4-FFF2-40B4-BE49-F238E27FC236}">
-                <a16:creationId xmlns:a16="http://schemas.microsoft.com/office/drawing/2014/main" id="{C382B31E-E979-4C70-A9EA-0880CB40CA4A}"/>
+              <a:rPr lang="de-DE" b="1" dirty="0"/>
+              <a:t>Web-Frontend</a:t>
+            </a:r>
+          </a:p>
+        </p:txBody>
+      </p:sp>
+      <p:cxnSp>
+        <p:nvCxnSpPr>
+          <p:cNvPr id="23" name="Gerade Verbindung mit Pfeil 22">
+            <a:extLst>
+              <a:ext uri="{FF2B5EF4-FFF2-40B4-BE49-F238E27FC236}">
+                <a16:creationId xmlns:a16="http://schemas.microsoft.com/office/drawing/2014/main" id="{367FA4C2-E2DE-4907-87FD-40E988E8EC14}"/>
+              </a:ext>
+            </a:extLst>
+          </p:cNvPr>
+          <p:cNvCxnSpPr>
+            <a:cxnSpLocks/>
+          </p:cNvCxnSpPr>
+          <p:nvPr/>
+        </p:nvCxnSpPr>
+        <p:spPr>
+          <a:xfrm flipH="1">
+            <a:off x="2052634" y="1984945"/>
+            <a:ext cx="2362802" cy="648925"/>
+          </a:xfrm>
+          <a:prstGeom prst="straightConnector1">
+            <a:avLst/>
+          </a:prstGeom>
+          <a:ln w="25400">
+            <a:solidFill>
+              <a:srgbClr val="CC0000"/>
+            </a:solidFill>
+            <a:headEnd w="lg" len="med"/>
+            <a:tailEnd type="triangle" w="lg" len="med"/>
+          </a:ln>
+        </p:spPr>
+        <p:style>
+          <a:lnRef idx="1">
+            <a:schemeClr val="accent1"/>
+          </a:lnRef>
+          <a:fillRef idx="0">
+            <a:schemeClr val="accent1"/>
+          </a:fillRef>
+          <a:effectRef idx="0">
+            <a:schemeClr val="accent1"/>
+          </a:effectRef>
+          <a:fontRef idx="minor">
+            <a:schemeClr val="tx1"/>
+          </a:fontRef>
+        </p:style>
+      </p:cxnSp>
+      <p:cxnSp>
+        <p:nvCxnSpPr>
+          <p:cNvPr id="21" name="Gerade Verbindung mit Pfeil 20">
+            <a:extLst>
+              <a:ext uri="{FF2B5EF4-FFF2-40B4-BE49-F238E27FC236}">
+                <a16:creationId xmlns:a16="http://schemas.microsoft.com/office/drawing/2014/main" id="{AFD6BFDF-F24F-4157-874F-E2A48DDDE65B}"/>
+              </a:ext>
+            </a:extLst>
+          </p:cNvPr>
+          <p:cNvCxnSpPr>
+            <a:cxnSpLocks/>
+          </p:cNvCxnSpPr>
+          <p:nvPr/>
+        </p:nvCxnSpPr>
+        <p:spPr>
+          <a:xfrm flipV="1">
+            <a:off x="2048345" y="1482791"/>
+            <a:ext cx="2359805" cy="627950"/>
+          </a:xfrm>
+          <a:prstGeom prst="straightConnector1">
+            <a:avLst/>
+          </a:prstGeom>
+          <a:ln w="25400">
+            <a:solidFill>
+              <a:srgbClr val="CC0000"/>
+            </a:solidFill>
+            <a:headEnd w="lg" len="med"/>
+            <a:tailEnd type="triangle" w="lg" len="med"/>
+          </a:ln>
+        </p:spPr>
+        <p:style>
+          <a:lnRef idx="1">
+            <a:schemeClr val="accent1"/>
+          </a:lnRef>
+          <a:fillRef idx="0">
+            <a:schemeClr val="accent1"/>
+          </a:fillRef>
+          <a:effectRef idx="0">
+            <a:schemeClr val="accent1"/>
+          </a:effectRef>
+          <a:fontRef idx="minor">
+            <a:schemeClr val="tx1"/>
+          </a:fontRef>
+        </p:style>
+      </p:cxnSp>
+      <p:sp>
+        <p:nvSpPr>
+          <p:cNvPr id="107" name="Rechteck 106">
+            <a:extLst>
+              <a:ext uri="{FF2B5EF4-FFF2-40B4-BE49-F238E27FC236}">
+                <a16:creationId xmlns:a16="http://schemas.microsoft.com/office/drawing/2014/main" id="{48F494FA-40CE-4832-8B8A-C0DECB68D350}"/>
               </a:ext>
             </a:extLst>
           </p:cNvPr>
@@ -6220,8 +6461,90 @@
         </p:nvSpPr>
         <p:spPr>
           <a:xfrm>
-            <a:off x="9658236" y="958447"/>
-            <a:ext cx="1517263" cy="1026498"/>
+            <a:off x="6101864" y="2916590"/>
+            <a:ext cx="1301863" cy="1096610"/>
+          </a:xfrm>
+          <a:prstGeom prst="rect">
+            <a:avLst/>
+          </a:prstGeom>
+          <a:solidFill>
+            <a:schemeClr val="tx2">
+              <a:lumMod val="75000"/>
+            </a:schemeClr>
+          </a:solidFill>
+          <a:ln>
+            <a:solidFill>
+              <a:schemeClr val="tx1"/>
+            </a:solidFill>
+          </a:ln>
+        </p:spPr>
+        <p:style>
+          <a:lnRef idx="2">
+            <a:schemeClr val="accent1">
+              <a:shade val="50000"/>
+            </a:schemeClr>
+          </a:lnRef>
+          <a:fillRef idx="1">
+            <a:schemeClr val="accent1"/>
+          </a:fillRef>
+          <a:effectRef idx="0">
+            <a:schemeClr val="accent1"/>
+          </a:effectRef>
+          <a:fontRef idx="minor">
+            <a:schemeClr val="lt1"/>
+          </a:fontRef>
+        </p:style>
+        <p:txBody>
+          <a:bodyPr rtlCol="0" anchor="ctr"/>
+          <a:lstStyle/>
+          <a:p>
+            <a:pPr algn="ctr"/>
+            <a:r>
+              <a:rPr lang="de-DE" b="1" dirty="0"/>
+              <a:t>MPI-</a:t>
+            </a:r>
+            <a:r>
+              <a:rPr lang="de-DE" b="1" dirty="0" err="1"/>
+              <a:t>To</a:t>
+            </a:r>
+            <a:r>
+              <a:rPr lang="de-DE" b="1" dirty="0"/>
+              <a:t>-Websocket-</a:t>
+            </a:r>
+            <a:r>
+              <a:rPr lang="de-DE" b="1" dirty="0" err="1"/>
+              <a:t>Result</a:t>
+            </a:r>
+            <a:br>
+              <a:rPr lang="de-DE" b="1" dirty="0"/>
+            </a:br>
+            <a:r>
+              <a:rPr lang="de-DE" sz="1300" b="1" dirty="0" err="1"/>
+              <a:t>Shared</a:t>
+            </a:r>
+            <a:r>
+              <a:rPr lang="de-DE" sz="1300" b="1" dirty="0"/>
+              <a:t> Data</a:t>
+            </a:r>
+          </a:p>
+        </p:txBody>
+      </p:sp>
+      <p:sp>
+        <p:nvSpPr>
+          <p:cNvPr id="65" name="Rechteck 64">
+            <a:extLst>
+              <a:ext uri="{FF2B5EF4-FFF2-40B4-BE49-F238E27FC236}">
+                <a16:creationId xmlns:a16="http://schemas.microsoft.com/office/drawing/2014/main" id="{2FA2F53C-E993-470F-A85B-4D39F49A4440}"/>
+              </a:ext>
+            </a:extLst>
+          </p:cNvPr>
+          <p:cNvSpPr/>
+          <p:nvPr/>
+        </p:nvSpPr>
+        <p:spPr>
+          <a:xfrm>
+            <a:off x="9610778" y="3878578"/>
+            <a:ext cx="1623308" cy="1026498"/>
           </a:xfrm>
           <a:prstGeom prst="rect">
             <a:avLst/>
@@ -6259,365 +6582,24 @@
           <a:p>
             <a:pPr algn="ctr"/>
             <a:r>
-              <a:rPr lang="de-DE" dirty="0"/>
+              <a:rPr lang="de-DE" b="1" dirty="0"/>
               <a:t>MPI-</a:t>
             </a:r>
             <a:r>
-              <a:rPr lang="de-DE" dirty="0" err="1"/>
+              <a:rPr lang="de-DE" b="1" dirty="0" err="1"/>
               <a:t>Worker</a:t>
             </a:r>
             <a:r>
-              <a:rPr lang="de-DE" dirty="0"/>
+              <a:rPr lang="de-DE" b="1" dirty="0"/>
               <a:t>-Thread</a:t>
             </a:r>
             <a:br>
-              <a:rPr lang="de-DE" dirty="0"/>
+              <a:rPr lang="de-DE" b="1" dirty="0"/>
             </a:br>
             <a:r>
-              <a:rPr lang="de-DE" sz="1200" dirty="0"/>
+              <a:rPr lang="de-DE" sz="1300" b="1" dirty="0"/>
               <a:t>MPI und Berechnung</a:t>
             </a:r>
-            <a:endParaRPr lang="de-DE" dirty="0"/>
-          </a:p>
-        </p:txBody>
-      </p:sp>
-      <p:sp>
-        <p:nvSpPr>
-          <p:cNvPr id="8" name="Rechteck 7">
-            <a:extLst>
-              <a:ext uri="{FF2B5EF4-FFF2-40B4-BE49-F238E27FC236}">
-                <a16:creationId xmlns:a16="http://schemas.microsoft.com/office/drawing/2014/main" id="{2162955D-7DA5-4CD0-80D1-429FE3B4216C}"/>
-              </a:ext>
-            </a:extLst>
-          </p:cNvPr>
-          <p:cNvSpPr/>
-          <p:nvPr/>
-        </p:nvSpPr>
-        <p:spPr>
-          <a:xfrm>
-            <a:off x="4412439" y="1109887"/>
-            <a:ext cx="1408589" cy="1250122"/>
-          </a:xfrm>
-          <a:prstGeom prst="rect">
-            <a:avLst/>
-          </a:prstGeom>
-        </p:spPr>
-        <p:style>
-          <a:lnRef idx="2">
-            <a:schemeClr val="accent1">
-              <a:shade val="50000"/>
-            </a:schemeClr>
-          </a:lnRef>
-          <a:fillRef idx="1">
-            <a:schemeClr val="accent1"/>
-          </a:fillRef>
-          <a:effectRef idx="0">
-            <a:schemeClr val="accent1"/>
-          </a:effectRef>
-          <a:fontRef idx="minor">
-            <a:schemeClr val="lt1"/>
-          </a:fontRef>
-        </p:style>
-        <p:txBody>
-          <a:bodyPr rtlCol="0" anchor="ctr"/>
-          <a:lstStyle/>
-          <a:p>
-            <a:pPr algn="ctr"/>
-            <a:r>
-              <a:rPr lang="de-DE" dirty="0"/>
-              <a:t>Websocket-</a:t>
-            </a:r>
-            <a:r>
-              <a:rPr lang="de-DE" dirty="0" err="1"/>
-              <a:t>Recv</a:t>
-            </a:r>
-            <a:r>
-              <a:rPr lang="de-DE" dirty="0"/>
-              <a:t>-Thread</a:t>
-            </a:r>
-            <a:br>
-              <a:rPr lang="de-DE" dirty="0"/>
-            </a:br>
-            <a:r>
-              <a:rPr lang="de-DE" sz="1200" dirty="0"/>
-              <a:t>Websocket und </a:t>
-            </a:r>
-            <a:r>
-              <a:rPr lang="de-DE" sz="1200" dirty="0" err="1"/>
-              <a:t>Balancing</a:t>
-            </a:r>
-            <a:endParaRPr lang="de-DE" dirty="0"/>
-          </a:p>
-        </p:txBody>
-      </p:sp>
-      <p:cxnSp>
-        <p:nvCxnSpPr>
-          <p:cNvPr id="77" name="Gerader Verbinder 76">
-            <a:extLst>
-              <a:ext uri="{FF2B5EF4-FFF2-40B4-BE49-F238E27FC236}">
-                <a16:creationId xmlns:a16="http://schemas.microsoft.com/office/drawing/2014/main" id="{1A9F6C7B-AB44-4E96-B41A-F043BE09EE50}"/>
-              </a:ext>
-            </a:extLst>
-          </p:cNvPr>
-          <p:cNvCxnSpPr>
-            <a:stCxn id="69" idx="0"/>
-          </p:cNvCxnSpPr>
-          <p:nvPr/>
-        </p:nvCxnSpPr>
-        <p:spPr>
-          <a:xfrm flipH="1" flipV="1">
-            <a:off x="6752421" y="955364"/>
-            <a:ext cx="1" cy="165527"/>
-          </a:xfrm>
-          <a:prstGeom prst="line">
-            <a:avLst/>
-          </a:prstGeom>
-          <a:ln w="15875">
-            <a:solidFill>
-              <a:schemeClr val="accent2"/>
-            </a:solidFill>
-          </a:ln>
-        </p:spPr>
-        <p:style>
-          <a:lnRef idx="1">
-            <a:schemeClr val="accent1"/>
-          </a:lnRef>
-          <a:fillRef idx="0">
-            <a:schemeClr val="accent1"/>
-          </a:fillRef>
-          <a:effectRef idx="0">
-            <a:schemeClr val="accent1"/>
-          </a:effectRef>
-          <a:fontRef idx="minor">
-            <a:schemeClr val="tx1"/>
-          </a:fontRef>
-        </p:style>
-      </p:cxnSp>
-      <p:sp>
-        <p:nvSpPr>
-          <p:cNvPr id="4" name="Rechteck 3">
-            <a:extLst>
-              <a:ext uri="{FF2B5EF4-FFF2-40B4-BE49-F238E27FC236}">
-                <a16:creationId xmlns:a16="http://schemas.microsoft.com/office/drawing/2014/main" id="{07ACD520-35FF-4146-A39B-D807EEC24F12}"/>
-              </a:ext>
-            </a:extLst>
-          </p:cNvPr>
-          <p:cNvSpPr/>
-          <p:nvPr/>
-        </p:nvSpPr>
-        <p:spPr>
-          <a:xfrm>
-            <a:off x="336899" y="762324"/>
-            <a:ext cx="1711446" cy="5311589"/>
-          </a:xfrm>
-          <a:prstGeom prst="rect">
-            <a:avLst/>
-          </a:prstGeom>
-          <a:solidFill>
-            <a:srgbClr val="CC0000"/>
-          </a:solidFill>
-          <a:ln>
-            <a:solidFill>
-              <a:srgbClr val="A50021"/>
-            </a:solidFill>
-          </a:ln>
-        </p:spPr>
-        <p:style>
-          <a:lnRef idx="2">
-            <a:schemeClr val="accent1">
-              <a:shade val="50000"/>
-            </a:schemeClr>
-          </a:lnRef>
-          <a:fillRef idx="1">
-            <a:schemeClr val="accent1"/>
-          </a:fillRef>
-          <a:effectRef idx="0">
-            <a:schemeClr val="accent1"/>
-          </a:effectRef>
-          <a:fontRef idx="minor">
-            <a:schemeClr val="lt1"/>
-          </a:fontRef>
-        </p:style>
-        <p:txBody>
-          <a:bodyPr rtlCol="0" anchor="ctr"/>
-          <a:lstStyle/>
-          <a:p>
-            <a:pPr algn="ctr"/>
-            <a:r>
-              <a:rPr lang="de-DE" dirty="0"/>
-              <a:t>Web-Frontend</a:t>
-            </a:r>
-          </a:p>
-        </p:txBody>
-      </p:sp>
-      <p:cxnSp>
-        <p:nvCxnSpPr>
-          <p:cNvPr id="23" name="Gerade Verbindung mit Pfeil 22">
-            <a:extLst>
-              <a:ext uri="{FF2B5EF4-FFF2-40B4-BE49-F238E27FC236}">
-                <a16:creationId xmlns:a16="http://schemas.microsoft.com/office/drawing/2014/main" id="{367FA4C2-E2DE-4907-87FD-40E988E8EC14}"/>
-              </a:ext>
-            </a:extLst>
-          </p:cNvPr>
-          <p:cNvCxnSpPr>
-            <a:cxnSpLocks/>
-          </p:cNvCxnSpPr>
-          <p:nvPr/>
-        </p:nvCxnSpPr>
-        <p:spPr>
-          <a:xfrm flipH="1">
-            <a:off x="2052634" y="1984945"/>
-            <a:ext cx="2362802" cy="648925"/>
-          </a:xfrm>
-          <a:prstGeom prst="straightConnector1">
-            <a:avLst/>
-          </a:prstGeom>
-          <a:ln w="15875">
-            <a:solidFill>
-              <a:schemeClr val="accent2"/>
-            </a:solidFill>
-            <a:tailEnd type="triangle"/>
-          </a:ln>
-        </p:spPr>
-        <p:style>
-          <a:lnRef idx="1">
-            <a:schemeClr val="accent1"/>
-          </a:lnRef>
-          <a:fillRef idx="0">
-            <a:schemeClr val="accent1"/>
-          </a:fillRef>
-          <a:effectRef idx="0">
-            <a:schemeClr val="accent1"/>
-          </a:effectRef>
-          <a:fontRef idx="minor">
-            <a:schemeClr val="tx1"/>
-          </a:fontRef>
-        </p:style>
-      </p:cxnSp>
-      <p:cxnSp>
-        <p:nvCxnSpPr>
-          <p:cNvPr id="21" name="Gerade Verbindung mit Pfeil 20">
-            <a:extLst>
-              <a:ext uri="{FF2B5EF4-FFF2-40B4-BE49-F238E27FC236}">
-                <a16:creationId xmlns:a16="http://schemas.microsoft.com/office/drawing/2014/main" id="{AFD6BFDF-F24F-4157-874F-E2A48DDDE65B}"/>
-              </a:ext>
-            </a:extLst>
-          </p:cNvPr>
-          <p:cNvCxnSpPr>
-            <a:cxnSpLocks/>
-          </p:cNvCxnSpPr>
-          <p:nvPr/>
-        </p:nvCxnSpPr>
-        <p:spPr>
-          <a:xfrm flipV="1">
-            <a:off x="2048345" y="1482791"/>
-            <a:ext cx="2359805" cy="627950"/>
-          </a:xfrm>
-          <a:prstGeom prst="straightConnector1">
-            <a:avLst/>
-          </a:prstGeom>
-          <a:ln w="15875">
-            <a:solidFill>
-              <a:schemeClr val="accent2"/>
-            </a:solidFill>
-            <a:tailEnd type="triangle"/>
-          </a:ln>
-        </p:spPr>
-        <p:style>
-          <a:lnRef idx="1">
-            <a:schemeClr val="accent1"/>
-          </a:lnRef>
-          <a:fillRef idx="0">
-            <a:schemeClr val="accent1"/>
-          </a:fillRef>
-          <a:effectRef idx="0">
-            <a:schemeClr val="accent1"/>
-          </a:effectRef>
-          <a:fontRef idx="minor">
-            <a:schemeClr val="tx1"/>
-          </a:fontRef>
-        </p:style>
-      </p:cxnSp>
-      <p:sp>
-        <p:nvSpPr>
-          <p:cNvPr id="107" name="Rechteck 106">
-            <a:extLst>
-              <a:ext uri="{FF2B5EF4-FFF2-40B4-BE49-F238E27FC236}">
-                <a16:creationId xmlns:a16="http://schemas.microsoft.com/office/drawing/2014/main" id="{48F494FA-40CE-4832-8B8A-C0DECB68D350}"/>
-              </a:ext>
-            </a:extLst>
-          </p:cNvPr>
-          <p:cNvSpPr/>
-          <p:nvPr/>
-        </p:nvSpPr>
-        <p:spPr>
-          <a:xfrm>
-            <a:off x="6101864" y="2916590"/>
-            <a:ext cx="1301863" cy="1096610"/>
-          </a:xfrm>
-          <a:prstGeom prst="rect">
-            <a:avLst/>
-          </a:prstGeom>
-          <a:solidFill>
-            <a:schemeClr val="tx2">
-              <a:lumMod val="75000"/>
-            </a:schemeClr>
-          </a:solidFill>
-          <a:ln>
-            <a:solidFill>
-              <a:schemeClr val="tx1"/>
-            </a:solidFill>
-          </a:ln>
-        </p:spPr>
-        <p:style>
-          <a:lnRef idx="2">
-            <a:schemeClr val="accent1">
-              <a:shade val="50000"/>
-            </a:schemeClr>
-          </a:lnRef>
-          <a:fillRef idx="1">
-            <a:schemeClr val="accent1"/>
-          </a:fillRef>
-          <a:effectRef idx="0">
-            <a:schemeClr val="accent1"/>
-          </a:effectRef>
-          <a:fontRef idx="minor">
-            <a:schemeClr val="lt1"/>
-          </a:fontRef>
-        </p:style>
-        <p:txBody>
-          <a:bodyPr rtlCol="0" anchor="ctr"/>
-          <a:lstStyle/>
-          <a:p>
-            <a:pPr algn="ctr"/>
-            <a:r>
-              <a:rPr lang="de-DE" dirty="0"/>
-              <a:t>MPI-</a:t>
-            </a:r>
-            <a:r>
-              <a:rPr lang="de-DE" dirty="0" err="1"/>
-              <a:t>To</a:t>
-            </a:r>
-            <a:r>
-              <a:rPr lang="de-DE" dirty="0"/>
-              <a:t>-Websocket-</a:t>
-            </a:r>
-            <a:r>
-              <a:rPr lang="de-DE" dirty="0" err="1"/>
-              <a:t>Result</a:t>
-            </a:r>
-            <a:br>
-              <a:rPr lang="de-DE" dirty="0"/>
-            </a:br>
-            <a:r>
-              <a:rPr lang="de-DE" sz="1200" dirty="0" err="1"/>
-              <a:t>Shared</a:t>
-            </a:r>
-            <a:r>
-              <a:rPr lang="de-DE" sz="1200" dirty="0"/>
-              <a:t> Data</a:t>
-            </a:r>
-            <a:endParaRPr lang="de-DE" dirty="0"/>
           </a:p>
         </p:txBody>
       </p:sp>

</xml_diff>